<commit_message>
Code cleanup and slides
</commit_message>
<xml_diff>
--- a/slides/01_intro.pptx
+++ b/slides/01_intro.pptx
@@ -215,7 +215,7 @@
           <a:p>
             <a:fld id="{1C0F8777-1296-8B4D-9BD4-528A6F96FB80}" type="datetimeFigureOut">
               <a:rPr lang="en-US" smtClean="0"/>
-              <a:t>9/21/22</a:t>
+              <a:t>1/10/23</a:t>
             </a:fld>
             <a:endParaRPr lang="pt-BR" dirty="0"/>
           </a:p>
@@ -748,7 +748,7 @@
           <a:p>
             <a:fld id="{8CEE3E6A-85A8-0947-B623-4BBAB6FD848A}" type="datetimeFigureOut">
               <a:rPr lang="en-US" smtClean="0"/>
-              <a:t>9/21/22</a:t>
+              <a:t>1/10/23</a:t>
             </a:fld>
             <a:endParaRPr lang="pt-BR" dirty="0"/>
           </a:p>
@@ -918,7 +918,7 @@
           <a:p>
             <a:fld id="{8CEE3E6A-85A8-0947-B623-4BBAB6FD848A}" type="datetimeFigureOut">
               <a:rPr lang="en-US" smtClean="0"/>
-              <a:t>9/21/22</a:t>
+              <a:t>1/10/23</a:t>
             </a:fld>
             <a:endParaRPr lang="pt-BR" dirty="0"/>
           </a:p>
@@ -1098,7 +1098,7 @@
           <a:p>
             <a:fld id="{8CEE3E6A-85A8-0947-B623-4BBAB6FD848A}" type="datetimeFigureOut">
               <a:rPr lang="en-US" smtClean="0"/>
-              <a:t>9/21/22</a:t>
+              <a:t>1/10/23</a:t>
             </a:fld>
             <a:endParaRPr lang="pt-BR" dirty="0"/>
           </a:p>
@@ -1268,7 +1268,7 @@
           <a:p>
             <a:fld id="{8CEE3E6A-85A8-0947-B623-4BBAB6FD848A}" type="datetimeFigureOut">
               <a:rPr lang="en-US" smtClean="0"/>
-              <a:t>9/21/22</a:t>
+              <a:t>1/10/23</a:t>
             </a:fld>
             <a:endParaRPr lang="pt-BR" dirty="0"/>
           </a:p>
@@ -1514,7 +1514,7 @@
           <a:p>
             <a:fld id="{8CEE3E6A-85A8-0947-B623-4BBAB6FD848A}" type="datetimeFigureOut">
               <a:rPr lang="en-US" smtClean="0"/>
-              <a:t>9/21/22</a:t>
+              <a:t>1/10/23</a:t>
             </a:fld>
             <a:endParaRPr lang="pt-BR" dirty="0"/>
           </a:p>
@@ -1802,7 +1802,7 @@
           <a:p>
             <a:fld id="{8CEE3E6A-85A8-0947-B623-4BBAB6FD848A}" type="datetimeFigureOut">
               <a:rPr lang="en-US" smtClean="0"/>
-              <a:t>9/21/22</a:t>
+              <a:t>1/10/23</a:t>
             </a:fld>
             <a:endParaRPr lang="pt-BR" dirty="0"/>
           </a:p>
@@ -2224,7 +2224,7 @@
           <a:p>
             <a:fld id="{8CEE3E6A-85A8-0947-B623-4BBAB6FD848A}" type="datetimeFigureOut">
               <a:rPr lang="en-US" smtClean="0"/>
-              <a:t>9/21/22</a:t>
+              <a:t>1/10/23</a:t>
             </a:fld>
             <a:endParaRPr lang="pt-BR" dirty="0"/>
           </a:p>
@@ -2342,7 +2342,7 @@
           <a:p>
             <a:fld id="{8CEE3E6A-85A8-0947-B623-4BBAB6FD848A}" type="datetimeFigureOut">
               <a:rPr lang="en-US" smtClean="0"/>
-              <a:t>9/21/22</a:t>
+              <a:t>1/10/23</a:t>
             </a:fld>
             <a:endParaRPr lang="pt-BR" dirty="0"/>
           </a:p>
@@ -2437,7 +2437,7 @@
           <a:p>
             <a:fld id="{8CEE3E6A-85A8-0947-B623-4BBAB6FD848A}" type="datetimeFigureOut">
               <a:rPr lang="en-US" smtClean="0"/>
-              <a:t>9/21/22</a:t>
+              <a:t>1/10/23</a:t>
             </a:fld>
             <a:endParaRPr lang="pt-BR" dirty="0"/>
           </a:p>
@@ -2714,7 +2714,7 @@
           <a:p>
             <a:fld id="{8CEE3E6A-85A8-0947-B623-4BBAB6FD848A}" type="datetimeFigureOut">
               <a:rPr lang="en-US" smtClean="0"/>
-              <a:t>9/21/22</a:t>
+              <a:t>1/10/23</a:t>
             </a:fld>
             <a:endParaRPr lang="pt-BR" dirty="0"/>
           </a:p>
@@ -2967,7 +2967,7 @@
           <a:p>
             <a:fld id="{8CEE3E6A-85A8-0947-B623-4BBAB6FD848A}" type="datetimeFigureOut">
               <a:rPr lang="en-US" smtClean="0"/>
-              <a:t>9/21/22</a:t>
+              <a:t>1/10/23</a:t>
             </a:fld>
             <a:endParaRPr lang="pt-BR" dirty="0"/>
           </a:p>
@@ -3180,7 +3180,7 @@
           <a:p>
             <a:fld id="{8CEE3E6A-85A8-0947-B623-4BBAB6FD848A}" type="datetimeFigureOut">
               <a:rPr lang="en-US" smtClean="0"/>
-              <a:t>9/21/22</a:t>
+              <a:t>1/10/23</a:t>
             </a:fld>
             <a:endParaRPr lang="pt-BR" dirty="0"/>
           </a:p>
@@ -3861,7 +3861,7 @@
                   </a:schemeClr>
                 </a:solidFill>
               </a:rPr>
-              <a:t>UCSC Extension - 2022</a:t>
+              <a:t>UCSC Extension - 2023</a:t>
             </a:r>
           </a:p>
         </p:txBody>
@@ -3938,7 +3938,7 @@
         <p:spPr/>
         <p:txBody>
           <a:bodyPr>
-            <a:normAutofit fontScale="92500" lnSpcReduction="10000"/>
+            <a:normAutofit/>
           </a:bodyPr>
           <a:lstStyle/>
           <a:p>
@@ -3952,7 +3952,7 @@
             <a:pPr lvl="2"/>
             <a:r>
               <a:rPr lang="en-US" dirty="0"/>
-              <a:t>Software Architect with 20+ years of experience.</a:t>
+              <a:t>System Architect with 20+ years of experience.</a:t>
             </a:r>
             <a:br>
               <a:rPr lang="en-US" dirty="0"/>
@@ -3963,7 +3963,7 @@
             <a:pPr lvl="2"/>
             <a:r>
               <a:rPr lang="en-US" dirty="0"/>
-              <a:t>Background in Machine Learning and Search engines</a:t>
+              <a:t>Background in AI, Machine Learning, and Search engines</a:t>
             </a:r>
             <a:br>
               <a:rPr lang="en-US" dirty="0"/>
@@ -3971,19 +3971,6 @@
             <a:endParaRPr lang="en-US" dirty="0"/>
           </a:p>
           <a:p>
-            <a:pPr lvl="2"/>
-            <a:r>
-              <a:rPr lang="en-US" dirty="0"/>
-              <a:t>Designing ML &amp; Big Data systems since 2007</a:t>
-            </a:r>
-          </a:p>
-          <a:p>
-            <a:pPr marL="914400" lvl="2" indent="0">
-              <a:buNone/>
-            </a:pPr>
-            <a:endParaRPr lang="en-US" dirty="0"/>
-          </a:p>
-          <a:p>
             <a:pPr marL="514350" lvl="1" indent="0">
               <a:buNone/>
             </a:pPr>
@@ -3993,7 +3980,7 @@
             </a:r>
             <a:r>
               <a:rPr lang="en-US" sz="2000" dirty="0"/>
-              <a:t>Some relevant presentations</a:t>
+              <a:t>Few relevant presentations</a:t>
             </a:r>
           </a:p>
           <a:p>
@@ -4141,36 +4128,49 @@
           </a:bodyPr>
           <a:lstStyle/>
           <a:p>
-            <a:pPr lvl="1"/>
-            <a:endParaRPr lang="en-US" dirty="0"/>
-          </a:p>
-          <a:p>
-            <a:pPr lvl="1"/>
-            <a:endParaRPr lang="en-US" dirty="0"/>
-          </a:p>
-          <a:p>
-            <a:pPr lvl="1"/>
-            <a:r>
-              <a:rPr lang="en-US" sz="3200" dirty="0"/>
-              <a:t>Your current role </a:t>
-            </a:r>
-            <a:br>
-              <a:rPr lang="en-US" sz="3200" dirty="0"/>
-            </a:br>
-            <a:endParaRPr lang="en-US" sz="3200" dirty="0"/>
-          </a:p>
-          <a:p>
-            <a:pPr lvl="1"/>
-            <a:r>
-              <a:rPr lang="en-US" sz="3200" dirty="0"/>
-              <a:t>Why are you taking this class?</a:t>
-            </a:r>
-          </a:p>
-          <a:p>
-            <a:pPr marL="914400" lvl="2" indent="0">
+            <a:pPr marL="457200" lvl="1" indent="0">
               <a:buNone/>
             </a:pPr>
             <a:endParaRPr lang="en-US" dirty="0"/>
+          </a:p>
+          <a:p>
+            <a:pPr lvl="1"/>
+            <a:r>
+              <a:rPr lang="en-US" sz="3600" dirty="0"/>
+              <a:t>Your current role </a:t>
+            </a:r>
+            <a:br>
+              <a:rPr lang="en-US" sz="3600" dirty="0"/>
+            </a:br>
+            <a:endParaRPr lang="en-US" sz="3600" dirty="0"/>
+          </a:p>
+          <a:p>
+            <a:pPr lvl="1"/>
+            <a:r>
+              <a:rPr lang="en-US" sz="3600" dirty="0"/>
+              <a:t>Why are you taking this class?</a:t>
+            </a:r>
+          </a:p>
+          <a:p>
+            <a:pPr lvl="1"/>
+            <a:endParaRPr lang="en-US" sz="3600" dirty="0"/>
+          </a:p>
+          <a:p>
+            <a:pPr lvl="1"/>
+            <a:r>
+              <a:rPr lang="en-US" sz="3600" dirty="0"/>
+              <a:t>What do you expect to lean?</a:t>
+            </a:r>
+          </a:p>
+          <a:p>
+            <a:pPr lvl="1"/>
+            <a:endParaRPr lang="en-US" sz="3600" dirty="0"/>
+          </a:p>
+          <a:p>
+            <a:pPr marL="914400" lvl="2" indent="0">
+              <a:buNone/>
+            </a:pPr>
+            <a:endParaRPr lang="en-US" sz="3600" dirty="0"/>
           </a:p>
           <a:p>
             <a:pPr marL="514350" lvl="1" indent="0">
@@ -4290,7 +4290,7 @@
         </p:nvSpPr>
         <p:spPr>
           <a:xfrm>
-            <a:off x="1316736" y="1508919"/>
+            <a:off x="1276979" y="1763920"/>
             <a:ext cx="6803135" cy="4756150"/>
           </a:xfrm>
         </p:spPr>
@@ -4312,7 +4312,7 @@
           <a:p>
             <a:r>
               <a:rPr lang="en-US" dirty="0"/>
-              <a:t>Commonly used Unix commands</a:t>
+              <a:t>Few commonly used Unix commands</a:t>
             </a:r>
           </a:p>
           <a:p>
@@ -4357,7 +4357,7 @@
           <a:p>
             <a:r>
               <a:rPr lang="en-US" dirty="0"/>
-              <a:t>Exploratory Data Analysis</a:t>
+              <a:t>Exploratory Data Analysis – Titanic Project</a:t>
             </a:r>
             <a:br>
               <a:rPr lang="en-US" dirty="0"/>
@@ -4367,15 +4367,15 @@
           <a:p>
             <a:r>
               <a:rPr lang="en-US" dirty="0"/>
-              <a:t>ML Model Building (</a:t>
+              <a:t>ML Model Building using Scikit-learn, TensorFlow/</a:t>
             </a:r>
             <a:r>
               <a:rPr lang="en-US" dirty="0" err="1"/>
-              <a:t>Skitlearn</a:t>
+              <a:t>Keras</a:t>
             </a:r>
             <a:r>
               <a:rPr lang="en-US" dirty="0"/>
-              <a:t>)</a:t>
+              <a:t>.</a:t>
             </a:r>
           </a:p>
           <a:p>
@@ -4479,39 +4479,6 @@
       </p:grpSpPr>
       <p:sp>
         <p:nvSpPr>
-          <p:cNvPr id="2" name="Title 1"/>
-          <p:cNvSpPr>
-            <a:spLocks noGrp="1"/>
-          </p:cNvSpPr>
-          <p:nvPr>
-            <p:ph type="title"/>
-          </p:nvPr>
-        </p:nvSpPr>
-        <p:spPr/>
-        <p:txBody>
-          <a:bodyPr>
-            <a:normAutofit/>
-          </a:bodyPr>
-          <a:lstStyle/>
-          <a:p>
-            <a:pPr>
-              <a:defRPr/>
-            </a:pPr>
-            <a:r>
-              <a:rPr lang="en-US" altLang="en-US" sz="3200" dirty="0">
-                <a:latin typeface="Arial" charset="0"/>
-                <a:ea typeface="Arial" charset="0"/>
-                <a:cs typeface="Arial" charset="0"/>
-                <a:sym typeface="Arial" charset="0"/>
-              </a:rPr>
-              <a:t>Recommended Books</a:t>
-            </a:r>
-            <a:endParaRPr lang="en-US" sz="3200" dirty="0"/>
-          </a:p>
-        </p:txBody>
-      </p:sp>
-      <p:sp>
-        <p:nvSpPr>
           <p:cNvPr id="3" name="Content Placeholder 2"/>
           <p:cNvSpPr>
             <a:spLocks noGrp="1"/>
@@ -4559,7 +4526,7 @@
         </p:nvSpPr>
         <p:spPr>
           <a:xfrm>
-            <a:off x="6063513" y="1415534"/>
+            <a:off x="6257593" y="2113863"/>
             <a:ext cx="1789849" cy="369332"/>
           </a:xfrm>
           <a:prstGeom prst="rect">
@@ -4594,7 +4561,7 @@
         </p:nvSpPr>
         <p:spPr>
           <a:xfrm>
-            <a:off x="1460757" y="1415534"/>
+            <a:off x="785382" y="2115449"/>
             <a:ext cx="2101024" cy="369332"/>
           </a:xfrm>
           <a:prstGeom prst="rect">
@@ -4617,10 +4584,10 @@
       </p:sp>
       <p:pic>
         <p:nvPicPr>
-          <p:cNvPr id="5" name="Picture 4" descr="Text&#10;&#10;Description automatically generated">
+          <p:cNvPr id="7" name="Picture 6" descr="Graphical user interface, application&#10;&#10;Description automatically generated">
             <a:extLst>
               <a:ext uri="{FF2B5EF4-FFF2-40B4-BE49-F238E27FC236}">
-                <a16:creationId xmlns:a16="http://schemas.microsoft.com/office/drawing/2014/main" id="{330AEC31-DEAC-6D40-A2DF-0D1073EC8FD3}"/>
+                <a16:creationId xmlns:a16="http://schemas.microsoft.com/office/drawing/2014/main" id="{2AEFD3CE-095B-D242-8F24-493543934B1D}"/>
               </a:ext>
             </a:extLst>
           </p:cNvPr>
@@ -4637,8 +4604,8 @@
         </p:blipFill>
         <p:spPr>
           <a:xfrm>
-            <a:off x="1046921" y="1784866"/>
-            <a:ext cx="2928696" cy="3512005"/>
+            <a:off x="6164420" y="2675625"/>
+            <a:ext cx="2003151" cy="2860467"/>
           </a:xfrm>
           <a:prstGeom prst="rect">
             <a:avLst/>
@@ -4647,10 +4614,10 @@
       </p:pic>
       <p:pic>
         <p:nvPicPr>
-          <p:cNvPr id="7" name="Picture 6" descr="Graphical user interface, application&#10;&#10;Description automatically generated">
+          <p:cNvPr id="6" name="Picture 5" descr="A picture containing text, reptile&#10;&#10;Description automatically generated">
             <a:extLst>
               <a:ext uri="{FF2B5EF4-FFF2-40B4-BE49-F238E27FC236}">
-                <a16:creationId xmlns:a16="http://schemas.microsoft.com/office/drawing/2014/main" id="{2AEFD3CE-095B-D242-8F24-493543934B1D}"/>
+                <a16:creationId xmlns:a16="http://schemas.microsoft.com/office/drawing/2014/main" id="{F271D242-B6DD-8308-3996-23CAE5E2CA4C}"/>
               </a:ext>
             </a:extLst>
           </p:cNvPr>
@@ -4667,14 +4634,164 @@
         </p:blipFill>
         <p:spPr>
           <a:xfrm>
-            <a:off x="5741107" y="1786970"/>
-            <a:ext cx="2181259" cy="3114802"/>
+            <a:off x="772063" y="2675625"/>
+            <a:ext cx="2193868" cy="2860467"/>
           </a:xfrm>
           <a:prstGeom prst="rect">
             <a:avLst/>
           </a:prstGeom>
         </p:spPr>
       </p:pic>
+      <p:pic>
+        <p:nvPicPr>
+          <p:cNvPr id="11" name="Picture 10" descr="Chart&#10;&#10;Description automatically generated with medium confidence">
+            <a:extLst>
+              <a:ext uri="{FF2B5EF4-FFF2-40B4-BE49-F238E27FC236}">
+                <a16:creationId xmlns:a16="http://schemas.microsoft.com/office/drawing/2014/main" id="{80C0A641-B024-5753-6273-9B2430037F2D}"/>
+              </a:ext>
+            </a:extLst>
+          </p:cNvPr>
+          <p:cNvPicPr>
+            <a:picLocks noChangeAspect="1"/>
+          </p:cNvPicPr>
+          <p:nvPr/>
+        </p:nvPicPr>
+        <p:blipFill>
+          <a:blip r:embed="rId4"/>
+          <a:stretch>
+            <a:fillRect/>
+          </a:stretch>
+        </p:blipFill>
+        <p:spPr>
+          <a:xfrm>
+            <a:off x="3429265" y="2675625"/>
+            <a:ext cx="2235275" cy="2860467"/>
+          </a:xfrm>
+          <a:prstGeom prst="rect">
+            <a:avLst/>
+          </a:prstGeom>
+        </p:spPr>
+      </p:pic>
+      <p:sp>
+        <p:nvSpPr>
+          <p:cNvPr id="12" name="TextBox 11">
+            <a:extLst>
+              <a:ext uri="{FF2B5EF4-FFF2-40B4-BE49-F238E27FC236}">
+                <a16:creationId xmlns:a16="http://schemas.microsoft.com/office/drawing/2014/main" id="{1C6B4A95-A722-1F16-752B-6B5FECEFF3D5}"/>
+              </a:ext>
+            </a:extLst>
+          </p:cNvPr>
+          <p:cNvSpPr txBox="1"/>
+          <p:nvPr/>
+        </p:nvSpPr>
+        <p:spPr>
+          <a:xfrm>
+            <a:off x="3583363" y="2113863"/>
+            <a:ext cx="1977273" cy="369332"/>
+          </a:xfrm>
+          <a:prstGeom prst="rect">
+            <a:avLst/>
+          </a:prstGeom>
+          <a:noFill/>
+        </p:spPr>
+        <p:txBody>
+          <a:bodyPr wrap="none" rtlCol="0">
+            <a:spAutoFit/>
+          </a:bodyPr>
+          <a:lstStyle/>
+          <a:p>
+            <a:r>
+              <a:rPr lang="en-US" dirty="0"/>
+              <a:t>Python Foundation</a:t>
+            </a:r>
+          </a:p>
+        </p:txBody>
+      </p:sp>
+      <p:sp>
+        <p:nvSpPr>
+          <p:cNvPr id="4" name="Title 7">
+            <a:extLst>
+              <a:ext uri="{FF2B5EF4-FFF2-40B4-BE49-F238E27FC236}">
+                <a16:creationId xmlns:a16="http://schemas.microsoft.com/office/drawing/2014/main" id="{30C771FB-444C-4EE5-D81F-177BDD73EB39}"/>
+              </a:ext>
+            </a:extLst>
+          </p:cNvPr>
+          <p:cNvSpPr txBox="1">
+            <a:spLocks/>
+          </p:cNvSpPr>
+          <p:nvPr/>
+        </p:nvSpPr>
+        <p:spPr>
+          <a:xfrm>
+            <a:off x="457200" y="126381"/>
+            <a:ext cx="8229600" cy="1143000"/>
+          </a:xfrm>
+          <a:prstGeom prst="rect">
+            <a:avLst/>
+          </a:prstGeom>
+        </p:spPr>
+        <p:txBody>
+          <a:bodyPr vert="horz" lIns="91440" tIns="45720" rIns="91440" bIns="45720" rtlCol="0" anchor="ctr">
+            <a:normAutofit/>
+          </a:bodyPr>
+          <a:lstStyle>
+            <a:lvl1pPr algn="ctr" defTabSz="457200" rtl="0" eaLnBrk="1" latinLnBrk="0" hangingPunct="1">
+              <a:spcBef>
+                <a:spcPct val="0"/>
+              </a:spcBef>
+              <a:buNone/>
+              <a:defRPr sz="4400" kern="1200">
+                <a:solidFill>
+                  <a:schemeClr val="tx1"/>
+                </a:solidFill>
+                <a:latin typeface="+mj-lt"/>
+                <a:ea typeface="+mj-ea"/>
+                <a:cs typeface="+mj-cs"/>
+              </a:defRPr>
+            </a:lvl1pPr>
+          </a:lstStyle>
+          <a:p>
+            <a:r>
+              <a:rPr lang="en-US" sz="2000" dirty="0">
+                <a:solidFill>
+                  <a:schemeClr val="tx2">
+                    <a:lumMod val="60000"/>
+                    <a:lumOff val="40000"/>
+                  </a:schemeClr>
+                </a:solidFill>
+                <a:latin typeface="Arial" panose="020B0604020202020204" pitchFamily="34" charset="0"/>
+                <a:cs typeface="Arial" panose="020B0604020202020204" pitchFamily="34" charset="0"/>
+              </a:rPr>
+              <a:t>About the class </a:t>
+            </a:r>
+            <a:br>
+              <a:rPr lang="en-US" sz="3000" dirty="0">
+                <a:solidFill>
+                  <a:schemeClr val="tx2">
+                    <a:lumMod val="60000"/>
+                    <a:lumOff val="40000"/>
+                  </a:schemeClr>
+                </a:solidFill>
+                <a:latin typeface="Arial" panose="020B0604020202020204" pitchFamily="34" charset="0"/>
+                <a:cs typeface="Arial" panose="020B0604020202020204" pitchFamily="34" charset="0"/>
+              </a:rPr>
+            </a:br>
+            <a:r>
+              <a:rPr lang="en-US" sz="3000" dirty="0">
+                <a:solidFill>
+                  <a:schemeClr val="tx2">
+                    <a:lumMod val="60000"/>
+                    <a:lumOff val="40000"/>
+                  </a:schemeClr>
+                </a:solidFill>
+                <a:latin typeface="Arial" panose="020B0604020202020204" pitchFamily="34" charset="0"/>
+                <a:cs typeface="Arial" panose="020B0604020202020204" pitchFamily="34" charset="0"/>
+              </a:rPr>
+              <a:t>Recommended books</a:t>
+            </a:r>
+          </a:p>
+        </p:txBody>
+      </p:sp>
     </p:spTree>
     <p:extLst>
       <p:ext uri="{BB962C8B-B14F-4D97-AF65-F5344CB8AC3E}">
@@ -4746,19 +4863,39 @@
         </p:nvSpPr>
         <p:spPr>
           <a:xfrm>
-            <a:off x="457200" y="1828800"/>
-            <a:ext cx="8229600" cy="4525963"/>
+            <a:off x="1510748" y="1520687"/>
+            <a:ext cx="7295322" cy="4525963"/>
           </a:xfrm>
         </p:spPr>
         <p:txBody>
           <a:bodyPr>
-            <a:normAutofit/>
+            <a:normAutofit fontScale="85000" lnSpcReduction="20000"/>
           </a:bodyPr>
           <a:lstStyle/>
           <a:p>
+            <a:pPr marL="0" indent="0">
+              <a:buNone/>
+            </a:pPr>
+            <a:endParaRPr lang="en-US" sz="2800" dirty="0"/>
+          </a:p>
+          <a:p>
             <a:r>
               <a:rPr lang="en-US" sz="2800" dirty="0"/>
-              <a:t>Create python programs and know how to optimize programs.</a:t>
+              <a:t>Notebooks</a:t>
+            </a:r>
+          </a:p>
+          <a:p>
+            <a:pPr lvl="1"/>
+            <a:r>
+              <a:rPr lang="en-US" sz="2400" dirty="0"/>
+              <a:t>Create and use python notebooks.</a:t>
+            </a:r>
+          </a:p>
+          <a:p>
+            <a:pPr lvl="1"/>
+            <a:r>
+              <a:rPr lang="en-US" sz="2400" dirty="0"/>
+              <a:t>Know how to optimize programs.</a:t>
             </a:r>
           </a:p>
           <a:p>
@@ -4767,7 +4904,28 @@
           <a:p>
             <a:r>
               <a:rPr lang="en-US" sz="2800" dirty="0"/>
-              <a:t>Create and use python notebooks.</a:t>
+              <a:t>Libraries</a:t>
+            </a:r>
+          </a:p>
+          <a:p>
+            <a:pPr lvl="1"/>
+            <a:r>
+              <a:rPr lang="en-US" sz="2400" dirty="0"/>
+              <a:t>Use pandas to load data</a:t>
+            </a:r>
+          </a:p>
+          <a:p>
+            <a:pPr lvl="1"/>
+            <a:r>
+              <a:rPr lang="en-US" sz="2400" dirty="0"/>
+              <a:t>Do math using NumPy</a:t>
+            </a:r>
+          </a:p>
+          <a:p>
+            <a:pPr lvl="1"/>
+            <a:r>
+              <a:rPr lang="en-US" sz="2400" dirty="0"/>
+              <a:t>Plot graphics in matplotlib/seaborn.</a:t>
             </a:r>
           </a:p>
           <a:p>
@@ -4776,16 +4934,21 @@
           <a:p>
             <a:r>
               <a:rPr lang="en-US" sz="2800" dirty="0"/>
-              <a:t>Use pandas to load data, do math using NumPy and plot graphics in matplotlib/seaborn.</a:t>
-            </a:r>
-          </a:p>
-          <a:p>
-            <a:endParaRPr lang="en-US" sz="2800" dirty="0"/>
-          </a:p>
-          <a:p>
-            <a:r>
-              <a:rPr lang="en-US" sz="2800" dirty="0"/>
-              <a:t>Continue to learn.</a:t>
+              <a:t>ML/AI</a:t>
+            </a:r>
+          </a:p>
+          <a:p>
+            <a:pPr lvl="1"/>
+            <a:r>
+              <a:rPr lang="en-US" sz="2400" dirty="0"/>
+              <a:t>Apply feature engineering</a:t>
+            </a:r>
+          </a:p>
+          <a:p>
+            <a:pPr lvl="1"/>
+            <a:r>
+              <a:rPr lang="en-US" sz="2400" dirty="0"/>
+              <a:t>Create and optimize ML models.</a:t>
             </a:r>
           </a:p>
           <a:p>
@@ -4934,7 +5097,7 @@
         </p:spPr>
         <p:txBody>
           <a:bodyPr>
-            <a:normAutofit fontScale="92500"/>
+            <a:normAutofit fontScale="92500" lnSpcReduction="20000"/>
           </a:bodyPr>
           <a:lstStyle/>
           <a:p>
@@ -4947,7 +5110,7 @@
             <a:pPr lvl="1"/>
             <a:r>
               <a:rPr lang="en-US" sz="2400" dirty="0"/>
-              <a:t>If you miss few advanced details, don’t worry too much.</a:t>
+              <a:t>If you miss a few details, don’t worry too much.</a:t>
             </a:r>
             <a:br>
               <a:rPr lang="en-US" sz="2400" dirty="0"/>
@@ -4962,7 +5125,7 @@
             </a:r>
             <a:r>
               <a:rPr lang="en-US" sz="2400" dirty="0"/>
-              <a:t> If you are lost, </a:t>
+              <a:t> If you are lost: </a:t>
             </a:r>
             <a:r>
               <a:rPr lang="en-US" sz="2400" b="1" u="sng" dirty="0">
@@ -4982,11 +5145,18 @@
                   </a:schemeClr>
                 </a:solidFill>
               </a:rPr>
-              <a:t> </a:t>
+              <a:t> a</a:t>
             </a:r>
             <a:r>
               <a:rPr lang="en-US" sz="2400" dirty="0"/>
-              <a:t>And ask for clarification.</a:t>
+              <a:t>nd ask for clarification.</a:t>
+            </a:r>
+            <a:br>
+              <a:rPr lang="en-US" sz="2400" dirty="0"/>
+            </a:br>
+            <a:r>
+              <a:rPr lang="en-US" sz="2400" dirty="0"/>
+              <a:t>Your questions will most certainly benefit others.</a:t>
             </a:r>
           </a:p>
           <a:p>
@@ -5005,14 +5175,14 @@
           <a:p>
             <a:r>
               <a:rPr lang="en-US" sz="2800" dirty="0"/>
-              <a:t>Material in the class is harder than the assignments.</a:t>
+              <a:t>The material covered in the class is more challenging than the assignments.</a:t>
             </a:r>
           </a:p>
           <a:p>
             <a:pPr lvl="1"/>
             <a:r>
               <a:rPr lang="en-US" sz="2400" dirty="0"/>
-              <a:t>This is by design, so advanced students can also benefit from the class.</a:t>
+              <a:t>This is by design, so more advanced students can also benefit from the class.</a:t>
             </a:r>
           </a:p>
           <a:p>
@@ -5021,7 +5191,25 @@
           <a:p>
             <a:r>
               <a:rPr lang="en-US" sz="2800" dirty="0"/>
-              <a:t>To succeed in this class, you need to spend time witting code!</a:t>
+              <a:t>To succeed in this class, you need to:</a:t>
+            </a:r>
+          </a:p>
+          <a:p>
+            <a:pPr lvl="1"/>
+            <a:r>
+              <a:rPr lang="en-US" sz="2400" dirty="0"/>
+              <a:t> </a:t>
+            </a:r>
+            <a:r>
+              <a:rPr lang="en-US" sz="2400" b="1" dirty="0">
+                <a:solidFill>
+                  <a:schemeClr val="tx2">
+                    <a:lumMod val="60000"/>
+                    <a:lumOff val="40000"/>
+                  </a:schemeClr>
+                </a:solidFill>
+              </a:rPr>
+              <a:t>Spend time witting code!</a:t>
             </a:r>
           </a:p>
           <a:p>
@@ -5079,6 +5267,12 @@
             </a:br>
             <a:r>
               <a:rPr lang="en-US" sz="3000" dirty="0">
+                <a:solidFill>
+                  <a:schemeClr val="tx2">
+                    <a:lumMod val="60000"/>
+                    <a:lumOff val="40000"/>
+                  </a:schemeClr>
+                </a:solidFill>
                 <a:latin typeface="Arial" panose="020B0604020202020204" pitchFamily="34" charset="0"/>
                 <a:cs typeface="Arial" panose="020B0604020202020204" pitchFamily="34" charset="0"/>
               </a:rPr>
@@ -5119,34 +5313,6 @@
       </p:grpSpPr>
       <p:sp>
         <p:nvSpPr>
-          <p:cNvPr id="2" name="Title 1">
-            <a:extLst>
-              <a:ext uri="{FF2B5EF4-FFF2-40B4-BE49-F238E27FC236}">
-                <a16:creationId xmlns:a16="http://schemas.microsoft.com/office/drawing/2014/main" id="{FCC90572-9DB2-5E47-8FFB-63B2F2C9F415}"/>
-              </a:ext>
-            </a:extLst>
-          </p:cNvPr>
-          <p:cNvSpPr>
-            <a:spLocks noGrp="1"/>
-          </p:cNvSpPr>
-          <p:nvPr>
-            <p:ph type="title"/>
-          </p:nvPr>
-        </p:nvSpPr>
-        <p:spPr/>
-        <p:txBody>
-          <a:bodyPr/>
-          <a:lstStyle/>
-          <a:p>
-            <a:r>
-              <a:rPr lang="en-US" dirty="0"/>
-              <a:t>Installing Python &amp; PyCharm</a:t>
-            </a:r>
-          </a:p>
-        </p:txBody>
-      </p:sp>
-      <p:sp>
-        <p:nvSpPr>
           <p:cNvPr id="3" name="TextBox 2">
             <a:extLst>
               <a:ext uri="{FF2B5EF4-FFF2-40B4-BE49-F238E27FC236}">
@@ -5159,7 +5325,7 @@
         </p:nvSpPr>
         <p:spPr>
           <a:xfrm>
-            <a:off x="746234" y="1261241"/>
+            <a:off x="766112" y="1570038"/>
             <a:ext cx="7419043" cy="1384995"/>
           </a:xfrm>
           <a:prstGeom prst="rect">
@@ -5180,7 +5346,7 @@
             <a:pPr lvl="1"/>
             <a:r>
               <a:rPr lang="en-US" sz="2800" dirty="0"/>
-              <a:t>The following links will allow you install the </a:t>
+              <a:t>The following links will allow you to install the </a:t>
             </a:r>
           </a:p>
           <a:p>
@@ -5206,7 +5372,7 @@
         </p:nvSpPr>
         <p:spPr>
           <a:xfrm>
-            <a:off x="1785744" y="2904113"/>
+            <a:off x="1785744" y="3429000"/>
             <a:ext cx="6901056" cy="2246769"/>
           </a:xfrm>
           <a:prstGeom prst="rect">
@@ -5221,12 +5387,8 @@
           <a:lstStyle/>
           <a:p>
             <a:r>
-              <a:rPr lang="en-US" sz="2800" dirty="0" err="1"/>
-              <a:t>Pycharm</a:t>
-            </a:r>
-            <a:r>
               <a:rPr lang="en-US" sz="2800" dirty="0"/>
-              <a:t> Edu edition</a:t>
+              <a:t>PyCharm Edu edition</a:t>
             </a:r>
           </a:p>
           <a:p>
@@ -5272,6 +5434,104 @@
             <a:r>
               <a:rPr lang="en-US" sz="2800" dirty="0"/>
               <a:t>/anaconda/install/</a:t>
+            </a:r>
+          </a:p>
+        </p:txBody>
+      </p:sp>
+      <p:sp>
+        <p:nvSpPr>
+          <p:cNvPr id="5" name="Title 7">
+            <a:extLst>
+              <a:ext uri="{FF2B5EF4-FFF2-40B4-BE49-F238E27FC236}">
+                <a16:creationId xmlns:a16="http://schemas.microsoft.com/office/drawing/2014/main" id="{3C1D5BE3-C24A-E0A6-DD6B-7383FFCCDD7F}"/>
+              </a:ext>
+            </a:extLst>
+          </p:cNvPr>
+          <p:cNvSpPr txBox="1">
+            <a:spLocks/>
+          </p:cNvSpPr>
+          <p:nvPr/>
+        </p:nvSpPr>
+        <p:spPr>
+          <a:xfrm>
+            <a:off x="609600" y="427038"/>
+            <a:ext cx="8229600" cy="1143000"/>
+          </a:xfrm>
+          <a:prstGeom prst="rect">
+            <a:avLst/>
+          </a:prstGeom>
+        </p:spPr>
+        <p:txBody>
+          <a:bodyPr vert="horz" lIns="91440" tIns="45720" rIns="91440" bIns="45720" rtlCol="0" anchor="ctr">
+            <a:normAutofit/>
+          </a:bodyPr>
+          <a:lstStyle>
+            <a:lvl1pPr algn="ctr" defTabSz="457200" rtl="0" eaLnBrk="1" latinLnBrk="0" hangingPunct="1">
+              <a:spcBef>
+                <a:spcPct val="0"/>
+              </a:spcBef>
+              <a:buNone/>
+              <a:defRPr sz="4400" kern="1200">
+                <a:solidFill>
+                  <a:schemeClr val="tx1"/>
+                </a:solidFill>
+                <a:latin typeface="+mj-lt"/>
+                <a:ea typeface="+mj-ea"/>
+                <a:cs typeface="+mj-cs"/>
+              </a:defRPr>
+            </a:lvl1pPr>
+          </a:lstStyle>
+          <a:p>
+            <a:r>
+              <a:rPr lang="en-US" sz="2000" dirty="0">
+                <a:solidFill>
+                  <a:schemeClr val="tx2">
+                    <a:lumMod val="60000"/>
+                    <a:lumOff val="40000"/>
+                  </a:schemeClr>
+                </a:solidFill>
+                <a:latin typeface="Arial" panose="020B0604020202020204" pitchFamily="34" charset="0"/>
+                <a:cs typeface="Arial" panose="020B0604020202020204" pitchFamily="34" charset="0"/>
+              </a:rPr>
+              <a:t>Development Environment</a:t>
+            </a:r>
+            <a:br>
+              <a:rPr lang="en-US" sz="3000" dirty="0">
+                <a:solidFill>
+                  <a:schemeClr val="tx2">
+                    <a:lumMod val="60000"/>
+                    <a:lumOff val="40000"/>
+                  </a:schemeClr>
+                </a:solidFill>
+                <a:latin typeface="Arial" panose="020B0604020202020204" pitchFamily="34" charset="0"/>
+                <a:cs typeface="Arial" panose="020B0604020202020204" pitchFamily="34" charset="0"/>
+              </a:rPr>
+            </a:br>
+            <a:r>
+              <a:rPr lang="en-US" sz="3000" dirty="0" err="1">
+                <a:solidFill>
+                  <a:schemeClr val="tx2">
+                    <a:lumMod val="60000"/>
+                    <a:lumOff val="40000"/>
+                  </a:schemeClr>
+                </a:solidFill>
+                <a:latin typeface="Arial" panose="020B0604020202020204" pitchFamily="34" charset="0"/>
+                <a:cs typeface="Arial" panose="020B0604020202020204" pitchFamily="34" charset="0"/>
+              </a:rPr>
+              <a:t>Jupyter</a:t>
+            </a:r>
+            <a:r>
+              <a:rPr lang="en-US" sz="3000" dirty="0">
+                <a:solidFill>
+                  <a:schemeClr val="tx2">
+                    <a:lumMod val="60000"/>
+                    <a:lumOff val="40000"/>
+                  </a:schemeClr>
+                </a:solidFill>
+                <a:latin typeface="Arial" panose="020B0604020202020204" pitchFamily="34" charset="0"/>
+                <a:cs typeface="Arial" panose="020B0604020202020204" pitchFamily="34" charset="0"/>
+              </a:rPr>
+              <a:t> &amp; Python IDE</a:t>
             </a:r>
           </a:p>
         </p:txBody>

</xml_diff>